<commit_message>
Interdiff between v8 and v9
</commit_message>
<xml_diff>
--- a/docs/diagrams/LogicComponentSequenceDiagram.pptx
+++ b/docs/diagrams/LogicComponentSequenceDiagram.pptx
@@ -208,7 +208,7 @@
           <a:p>
             <a:fld id="{F5CC4B3F-88C1-4FFA-B1B6-F41C21DC6924}" type="datetimeFigureOut">
               <a:rPr lang="en-US" smtClean="0"/>
-              <a:t>2/5/2017</a:t>
+              <a:t>2/6/2017</a:t>
             </a:fld>
             <a:endParaRPr lang="en-US"/>
           </a:p>
@@ -657,7 +657,7 @@
           <a:p>
             <a:fld id="{78C97017-6FC3-485B-9764-EAC9E56C1D49}" type="datetimeFigureOut">
               <a:rPr lang="en-US" smtClean="0"/>
-              <a:t>2/5/2017</a:t>
+              <a:t>2/6/2017</a:t>
             </a:fld>
             <a:endParaRPr lang="en-US"/>
           </a:p>
@@ -827,7 +827,7 @@
           <a:p>
             <a:fld id="{78C97017-6FC3-485B-9764-EAC9E56C1D49}" type="datetimeFigureOut">
               <a:rPr lang="en-US" smtClean="0"/>
-              <a:t>2/5/2017</a:t>
+              <a:t>2/6/2017</a:t>
             </a:fld>
             <a:endParaRPr lang="en-US"/>
           </a:p>
@@ -1007,7 +1007,7 @@
           <a:p>
             <a:fld id="{78C97017-6FC3-485B-9764-EAC9E56C1D49}" type="datetimeFigureOut">
               <a:rPr lang="en-US" smtClean="0"/>
-              <a:t>2/5/2017</a:t>
+              <a:t>2/6/2017</a:t>
             </a:fld>
             <a:endParaRPr lang="en-US"/>
           </a:p>
@@ -1177,7 +1177,7 @@
           <a:p>
             <a:fld id="{78C97017-6FC3-485B-9764-EAC9E56C1D49}" type="datetimeFigureOut">
               <a:rPr lang="en-US" smtClean="0"/>
-              <a:t>2/5/2017</a:t>
+              <a:t>2/6/2017</a:t>
             </a:fld>
             <a:endParaRPr lang="en-US"/>
           </a:p>
@@ -1423,7 +1423,7 @@
           <a:p>
             <a:fld id="{78C97017-6FC3-485B-9764-EAC9E56C1D49}" type="datetimeFigureOut">
               <a:rPr lang="en-US" smtClean="0"/>
-              <a:t>2/5/2017</a:t>
+              <a:t>2/6/2017</a:t>
             </a:fld>
             <a:endParaRPr lang="en-US"/>
           </a:p>
@@ -1711,7 +1711,7 @@
           <a:p>
             <a:fld id="{78C97017-6FC3-485B-9764-EAC9E56C1D49}" type="datetimeFigureOut">
               <a:rPr lang="en-US" smtClean="0"/>
-              <a:t>2/5/2017</a:t>
+              <a:t>2/6/2017</a:t>
             </a:fld>
             <a:endParaRPr lang="en-US"/>
           </a:p>
@@ -2133,7 +2133,7 @@
           <a:p>
             <a:fld id="{78C97017-6FC3-485B-9764-EAC9E56C1D49}" type="datetimeFigureOut">
               <a:rPr lang="en-US" smtClean="0"/>
-              <a:t>2/5/2017</a:t>
+              <a:t>2/6/2017</a:t>
             </a:fld>
             <a:endParaRPr lang="en-US"/>
           </a:p>
@@ -2251,7 +2251,7 @@
           <a:p>
             <a:fld id="{78C97017-6FC3-485B-9764-EAC9E56C1D49}" type="datetimeFigureOut">
               <a:rPr lang="en-US" smtClean="0"/>
-              <a:t>2/5/2017</a:t>
+              <a:t>2/6/2017</a:t>
             </a:fld>
             <a:endParaRPr lang="en-US"/>
           </a:p>
@@ -2346,7 +2346,7 @@
           <a:p>
             <a:fld id="{78C97017-6FC3-485B-9764-EAC9E56C1D49}" type="datetimeFigureOut">
               <a:rPr lang="en-US" smtClean="0"/>
-              <a:t>2/5/2017</a:t>
+              <a:t>2/6/2017</a:t>
             </a:fld>
             <a:endParaRPr lang="en-US"/>
           </a:p>
@@ -2623,7 +2623,7 @@
           <a:p>
             <a:fld id="{78C97017-6FC3-485B-9764-EAC9E56C1D49}" type="datetimeFigureOut">
               <a:rPr lang="en-US" smtClean="0"/>
-              <a:t>2/5/2017</a:t>
+              <a:t>2/6/2017</a:t>
             </a:fld>
             <a:endParaRPr lang="en-US"/>
           </a:p>
@@ -2876,7 +2876,7 @@
           <a:p>
             <a:fld id="{78C97017-6FC3-485B-9764-EAC9E56C1D49}" type="datetimeFigureOut">
               <a:rPr lang="en-US" smtClean="0"/>
-              <a:t>2/5/2017</a:t>
+              <a:t>2/6/2017</a:t>
             </a:fld>
             <a:endParaRPr lang="en-US"/>
           </a:p>
@@ -3089,7 +3089,7 @@
           <a:p>
             <a:fld id="{78C97017-6FC3-485B-9764-EAC9E56C1D49}" type="datetimeFigureOut">
               <a:rPr lang="en-US" smtClean="0"/>
-              <a:t>2/5/2017</a:t>
+              <a:t>2/6/2017</a:t>
             </a:fld>
             <a:endParaRPr lang="en-US"/>
           </a:p>
@@ -3910,14 +3910,13 @@
           <p:cNvPr id="20" name="Straight Connector 19"/>
           <p:cNvCxnSpPr>
             <a:stCxn id="21" idx="0"/>
-            <a:endCxn id="65" idx="2"/>
           </p:cNvCxnSpPr>
           <p:nvPr/>
         </p:nvCxnSpPr>
         <p:spPr>
-          <a:xfrm flipH="1">
-            <a:off x="6768113" y="3774278"/>
-            <a:ext cx="4461" cy="1712122"/>
+          <a:xfrm>
+            <a:off x="6772574" y="3774278"/>
+            <a:ext cx="0" cy="1940722"/>
           </a:xfrm>
           <a:prstGeom prst="line">
             <a:avLst/>
@@ -5169,7 +5168,8 @@
             <a:avLst/>
           </a:prstGeom>
           <a:ln w="19050">
-            <a:tailEnd type="triangle"/>
+            <a:headEnd type="none" w="med" len="med"/>
+            <a:tailEnd type="arrow" w="med" len="med"/>
           </a:ln>
         </p:spPr>
         <p:style>
@@ -5372,8 +5372,9 @@
           <a:prstGeom prst="straightConnector1">
             <a:avLst/>
           </a:prstGeom>
-          <a:ln>
-            <a:tailEnd type="triangle"/>
+          <a:ln w="19050">
+            <a:headEnd type="none" w="med" len="med"/>
+            <a:tailEnd type="arrow" w="med" len="med"/>
           </a:ln>
         </p:spPr>
         <p:style>
@@ -5465,6 +5466,44 @@
           </a:fontRef>
         </p:style>
       </p:cxnSp>
+      <p:sp>
+        <p:nvSpPr>
+          <p:cNvPr id="4" name="TextBox 3"/>
+          <p:cNvSpPr txBox="1"/>
+          <p:nvPr/>
+        </p:nvSpPr>
+        <p:spPr>
+          <a:xfrm>
+            <a:off x="5033665" y="4199590"/>
+            <a:ext cx="258404" cy="261610"/>
+          </a:xfrm>
+          <a:prstGeom prst="rect">
+            <a:avLst/>
+          </a:prstGeom>
+          <a:noFill/>
+        </p:spPr>
+        <p:txBody>
+          <a:bodyPr wrap="none" rtlCol="0">
+            <a:spAutoFit/>
+          </a:bodyPr>
+          <a:lstStyle/>
+          <a:p>
+            <a:r>
+              <a:rPr lang="en-SG" sz="1100" dirty="0" smtClean="0">
+                <a:solidFill>
+                  <a:srgbClr val="002060"/>
+                </a:solidFill>
+              </a:rPr>
+              <a:t>X</a:t>
+            </a:r>
+            <a:endParaRPr lang="en-SG" sz="1100" dirty="0">
+              <a:solidFill>
+                <a:srgbClr val="002060"/>
+              </a:solidFill>
+            </a:endParaRPr>
+          </a:p>
+        </p:txBody>
+      </p:sp>
     </p:spTree>
     <p:extLst>
       <p:ext uri="{BB962C8B-B14F-4D97-AF65-F5344CB8AC3E}">

</xml_diff>

<commit_message>
Interdiff between v7 and v8
</commit_message>
<xml_diff>
--- a/docs/diagrams/LogicComponentSequenceDiagram.pptx
+++ b/docs/diagrams/LogicComponentSequenceDiagram.pptx
@@ -208,7 +208,7 @@
           <a:p>
             <a:fld id="{F5CC4B3F-88C1-4FFA-B1B6-F41C21DC6924}" type="datetimeFigureOut">
               <a:rPr lang="en-US" smtClean="0"/>
-              <a:t>2/2/2017</a:t>
+              <a:t>2/5/2017</a:t>
             </a:fld>
             <a:endParaRPr lang="en-US"/>
           </a:p>
@@ -657,7 +657,7 @@
           <a:p>
             <a:fld id="{78C97017-6FC3-485B-9764-EAC9E56C1D49}" type="datetimeFigureOut">
               <a:rPr lang="en-US" smtClean="0"/>
-              <a:t>2/2/2017</a:t>
+              <a:t>2/5/2017</a:t>
             </a:fld>
             <a:endParaRPr lang="en-US"/>
           </a:p>
@@ -827,7 +827,7 @@
           <a:p>
             <a:fld id="{78C97017-6FC3-485B-9764-EAC9E56C1D49}" type="datetimeFigureOut">
               <a:rPr lang="en-US" smtClean="0"/>
-              <a:t>2/2/2017</a:t>
+              <a:t>2/5/2017</a:t>
             </a:fld>
             <a:endParaRPr lang="en-US"/>
           </a:p>
@@ -1007,7 +1007,7 @@
           <a:p>
             <a:fld id="{78C97017-6FC3-485B-9764-EAC9E56C1D49}" type="datetimeFigureOut">
               <a:rPr lang="en-US" smtClean="0"/>
-              <a:t>2/2/2017</a:t>
+              <a:t>2/5/2017</a:t>
             </a:fld>
             <a:endParaRPr lang="en-US"/>
           </a:p>
@@ -1177,7 +1177,7 @@
           <a:p>
             <a:fld id="{78C97017-6FC3-485B-9764-EAC9E56C1D49}" type="datetimeFigureOut">
               <a:rPr lang="en-US" smtClean="0"/>
-              <a:t>2/2/2017</a:t>
+              <a:t>2/5/2017</a:t>
             </a:fld>
             <a:endParaRPr lang="en-US"/>
           </a:p>
@@ -1423,7 +1423,7 @@
           <a:p>
             <a:fld id="{78C97017-6FC3-485B-9764-EAC9E56C1D49}" type="datetimeFigureOut">
               <a:rPr lang="en-US" smtClean="0"/>
-              <a:t>2/2/2017</a:t>
+              <a:t>2/5/2017</a:t>
             </a:fld>
             <a:endParaRPr lang="en-US"/>
           </a:p>
@@ -1711,7 +1711,7 @@
           <a:p>
             <a:fld id="{78C97017-6FC3-485B-9764-EAC9E56C1D49}" type="datetimeFigureOut">
               <a:rPr lang="en-US" smtClean="0"/>
-              <a:t>2/2/2017</a:t>
+              <a:t>2/5/2017</a:t>
             </a:fld>
             <a:endParaRPr lang="en-US"/>
           </a:p>
@@ -2133,7 +2133,7 @@
           <a:p>
             <a:fld id="{78C97017-6FC3-485B-9764-EAC9E56C1D49}" type="datetimeFigureOut">
               <a:rPr lang="en-US" smtClean="0"/>
-              <a:t>2/2/2017</a:t>
+              <a:t>2/5/2017</a:t>
             </a:fld>
             <a:endParaRPr lang="en-US"/>
           </a:p>
@@ -2251,7 +2251,7 @@
           <a:p>
             <a:fld id="{78C97017-6FC3-485B-9764-EAC9E56C1D49}" type="datetimeFigureOut">
               <a:rPr lang="en-US" smtClean="0"/>
-              <a:t>2/2/2017</a:t>
+              <a:t>2/5/2017</a:t>
             </a:fld>
             <a:endParaRPr lang="en-US"/>
           </a:p>
@@ -2346,7 +2346,7 @@
           <a:p>
             <a:fld id="{78C97017-6FC3-485B-9764-EAC9E56C1D49}" type="datetimeFigureOut">
               <a:rPr lang="en-US" smtClean="0"/>
-              <a:t>2/2/2017</a:t>
+              <a:t>2/5/2017</a:t>
             </a:fld>
             <a:endParaRPr lang="en-US"/>
           </a:p>
@@ -2623,7 +2623,7 @@
           <a:p>
             <a:fld id="{78C97017-6FC3-485B-9764-EAC9E56C1D49}" type="datetimeFigureOut">
               <a:rPr lang="en-US" smtClean="0"/>
-              <a:t>2/2/2017</a:t>
+              <a:t>2/5/2017</a:t>
             </a:fld>
             <a:endParaRPr lang="en-US"/>
           </a:p>
@@ -2876,7 +2876,7 @@
           <a:p>
             <a:fld id="{78C97017-6FC3-485B-9764-EAC9E56C1D49}" type="datetimeFigureOut">
               <a:rPr lang="en-US" smtClean="0"/>
-              <a:t>2/2/2017</a:t>
+              <a:t>2/5/2017</a:t>
             </a:fld>
             <a:endParaRPr lang="en-US"/>
           </a:p>
@@ -3089,7 +3089,7 @@
           <a:p>
             <a:fld id="{78C97017-6FC3-485B-9764-EAC9E56C1D49}" type="datetimeFigureOut">
               <a:rPr lang="en-US" smtClean="0"/>
-              <a:t>2/2/2017</a:t>
+              <a:t>2/5/2017</a:t>
             </a:fld>
             <a:endParaRPr lang="en-US"/>
           </a:p>
@@ -4718,7 +4718,7 @@
         </p:nvSpPr>
         <p:spPr>
           <a:xfrm>
-            <a:off x="3847551" y="3472934"/>
+            <a:off x="3847551" y="3657600"/>
             <a:ext cx="767033" cy="184666"/>
           </a:xfrm>
           <a:prstGeom prst="rect">

</xml_diff>

<commit_message>
Interdiff between v17 and v18
</commit_message>
<xml_diff>
--- a/docs/diagrams/LogicComponentSequenceDiagram.pptx
+++ b/docs/diagrams/LogicComponentSequenceDiagram.pptx
@@ -212,7 +212,7 @@
           <a:p>
             <a:fld id="{F5CC4B3F-88C1-4FFA-B1B6-F41C21DC6924}" type="datetimeFigureOut">
               <a:rPr lang="en-US" smtClean="0"/>
-              <a:t>5/31/2017</a:t>
+              <a:t>6/2/17</a:t>
             </a:fld>
             <a:endParaRPr lang="en-US"/>
           </a:p>
@@ -658,7 +658,7 @@
           <a:p>
             <a:fld id="{78C97017-6FC3-485B-9764-EAC9E56C1D49}" type="datetimeFigureOut">
               <a:rPr lang="en-US" smtClean="0"/>
-              <a:t>5/31/2017</a:t>
+              <a:t>6/2/17</a:t>
             </a:fld>
             <a:endParaRPr lang="en-US"/>
           </a:p>
@@ -826,7 +826,7 @@
           <a:p>
             <a:fld id="{78C97017-6FC3-485B-9764-EAC9E56C1D49}" type="datetimeFigureOut">
               <a:rPr lang="en-US" smtClean="0"/>
-              <a:t>5/31/2017</a:t>
+              <a:t>6/2/17</a:t>
             </a:fld>
             <a:endParaRPr lang="en-US"/>
           </a:p>
@@ -1004,7 +1004,7 @@
           <a:p>
             <a:fld id="{78C97017-6FC3-485B-9764-EAC9E56C1D49}" type="datetimeFigureOut">
               <a:rPr lang="en-US" smtClean="0"/>
-              <a:t>5/31/2017</a:t>
+              <a:t>6/2/17</a:t>
             </a:fld>
             <a:endParaRPr lang="en-US"/>
           </a:p>
@@ -1172,7 +1172,7 @@
           <a:p>
             <a:fld id="{78C97017-6FC3-485B-9764-EAC9E56C1D49}" type="datetimeFigureOut">
               <a:rPr lang="en-US" smtClean="0"/>
-              <a:t>5/31/2017</a:t>
+              <a:t>6/2/17</a:t>
             </a:fld>
             <a:endParaRPr lang="en-US"/>
           </a:p>
@@ -1417,7 +1417,7 @@
           <a:p>
             <a:fld id="{78C97017-6FC3-485B-9764-EAC9E56C1D49}" type="datetimeFigureOut">
               <a:rPr lang="en-US" smtClean="0"/>
-              <a:t>5/31/2017</a:t>
+              <a:t>6/2/17</a:t>
             </a:fld>
             <a:endParaRPr lang="en-US"/>
           </a:p>
@@ -1702,7 +1702,7 @@
           <a:p>
             <a:fld id="{78C97017-6FC3-485B-9764-EAC9E56C1D49}" type="datetimeFigureOut">
               <a:rPr lang="en-US" smtClean="0"/>
-              <a:t>5/31/2017</a:t>
+              <a:t>6/2/17</a:t>
             </a:fld>
             <a:endParaRPr lang="en-US"/>
           </a:p>
@@ -2121,7 +2121,7 @@
           <a:p>
             <a:fld id="{78C97017-6FC3-485B-9764-EAC9E56C1D49}" type="datetimeFigureOut">
               <a:rPr lang="en-US" smtClean="0"/>
-              <a:t>5/31/2017</a:t>
+              <a:t>6/2/17</a:t>
             </a:fld>
             <a:endParaRPr lang="en-US"/>
           </a:p>
@@ -2238,7 +2238,7 @@
           <a:p>
             <a:fld id="{78C97017-6FC3-485B-9764-EAC9E56C1D49}" type="datetimeFigureOut">
               <a:rPr lang="en-US" smtClean="0"/>
-              <a:t>5/31/2017</a:t>
+              <a:t>6/2/17</a:t>
             </a:fld>
             <a:endParaRPr lang="en-US"/>
           </a:p>
@@ -2333,7 +2333,7 @@
           <a:p>
             <a:fld id="{78C97017-6FC3-485B-9764-EAC9E56C1D49}" type="datetimeFigureOut">
               <a:rPr lang="en-US" smtClean="0"/>
-              <a:t>5/31/2017</a:t>
+              <a:t>6/2/17</a:t>
             </a:fld>
             <a:endParaRPr lang="en-US"/>
           </a:p>
@@ -2608,7 +2608,7 @@
           <a:p>
             <a:fld id="{78C97017-6FC3-485B-9764-EAC9E56C1D49}" type="datetimeFigureOut">
               <a:rPr lang="en-US" smtClean="0"/>
-              <a:t>5/31/2017</a:t>
+              <a:t>6/2/17</a:t>
             </a:fld>
             <a:endParaRPr lang="en-US"/>
           </a:p>
@@ -2860,7 +2860,7 @@
           <a:p>
             <a:fld id="{78C97017-6FC3-485B-9764-EAC9E56C1D49}" type="datetimeFigureOut">
               <a:rPr lang="en-US" smtClean="0"/>
-              <a:t>5/31/2017</a:t>
+              <a:t>6/2/17</a:t>
             </a:fld>
             <a:endParaRPr lang="en-US"/>
           </a:p>
@@ -3071,7 +3071,7 @@
           <a:p>
             <a:fld id="{78C97017-6FC3-485B-9764-EAC9E56C1D49}" type="datetimeFigureOut">
               <a:rPr lang="en-US" smtClean="0"/>
-              <a:t>5/31/2017</a:t>
+              <a:t>6/2/17</a:t>
             </a:fld>
             <a:endParaRPr lang="en-US"/>
           </a:p>
@@ -3888,9 +3888,9 @@
           <p:nvPr/>
         </p:nvCxnSpPr>
         <p:spPr>
-          <a:xfrm flipH="1">
-            <a:off x="6759123" y="2298210"/>
-            <a:ext cx="1060" cy="3340590"/>
+          <a:xfrm>
+            <a:off x="6760183" y="2298210"/>
+            <a:ext cx="8686" cy="3492989"/>
           </a:xfrm>
           <a:prstGeom prst="line">
             <a:avLst/>
@@ -5171,9 +5171,9 @@
           <p:nvPr/>
         </p:nvCxnSpPr>
         <p:spPr>
-          <a:xfrm flipH="1">
-            <a:off x="5154362" y="1995586"/>
-            <a:ext cx="6583" cy="1585814"/>
+          <a:xfrm>
+            <a:off x="5160946" y="1995586"/>
+            <a:ext cx="4474" cy="3795613"/>
           </a:xfrm>
           <a:prstGeom prst="line">
             <a:avLst/>
@@ -5835,6 +5835,204 @@
           </a:fontRef>
         </p:style>
       </p:cxnSp>
+      <p:sp>
+        <p:nvSpPr>
+          <p:cNvPr id="3" name="TextBox 2"/>
+          <p:cNvSpPr txBox="1"/>
+          <p:nvPr/>
+        </p:nvSpPr>
+        <p:spPr>
+          <a:xfrm>
+            <a:off x="5023181" y="5677709"/>
+            <a:ext cx="376751" cy="369332"/>
+          </a:xfrm>
+          <a:prstGeom prst="rect">
+            <a:avLst/>
+          </a:prstGeom>
+          <a:noFill/>
+        </p:spPr>
+        <p:txBody>
+          <a:bodyPr wrap="square" rtlCol="0">
+            <a:spAutoFit/>
+          </a:bodyPr>
+          <a:lstStyle/>
+          <a:p>
+            <a:r>
+              <a:rPr lang="en-US" dirty="0" smtClean="0"/>
+              <a:t>X</a:t>
+            </a:r>
+            <a:endParaRPr lang="en-US" dirty="0"/>
+          </a:p>
+        </p:txBody>
+      </p:sp>
+      <p:cxnSp>
+        <p:nvCxnSpPr>
+          <p:cNvPr id="57" name="Straight Connector 56"/>
+          <p:cNvCxnSpPr>
+            <a:stCxn id="86" idx="0"/>
+          </p:cNvCxnSpPr>
+          <p:nvPr/>
+        </p:nvCxnSpPr>
+        <p:spPr>
+          <a:xfrm>
+            <a:off x="7846316" y="4795655"/>
+            <a:ext cx="12581" cy="1012021"/>
+          </a:xfrm>
+          <a:prstGeom prst="line">
+            <a:avLst/>
+          </a:prstGeom>
+          <a:ln w="19050">
+            <a:solidFill>
+              <a:srgbClr val="0070C0"/>
+            </a:solidFill>
+            <a:prstDash val="sysDash"/>
+          </a:ln>
+          <a:effectLst/>
+        </p:spPr>
+        <p:style>
+          <a:lnRef idx="1">
+            <a:schemeClr val="accent1"/>
+          </a:lnRef>
+          <a:fillRef idx="2">
+            <a:schemeClr val="accent1"/>
+          </a:fillRef>
+          <a:effectRef idx="1">
+            <a:schemeClr val="accent1"/>
+          </a:effectRef>
+          <a:fontRef idx="minor">
+            <a:schemeClr val="dk1"/>
+          </a:fontRef>
+        </p:style>
+      </p:cxnSp>
+      <p:sp>
+        <p:nvSpPr>
+          <p:cNvPr id="60" name="TextBox 59"/>
+          <p:cNvSpPr txBox="1"/>
+          <p:nvPr/>
+        </p:nvSpPr>
+        <p:spPr>
+          <a:xfrm>
+            <a:off x="7702651" y="5681971"/>
+            <a:ext cx="376751" cy="369332"/>
+          </a:xfrm>
+          <a:prstGeom prst="rect">
+            <a:avLst/>
+          </a:prstGeom>
+          <a:noFill/>
+        </p:spPr>
+        <p:txBody>
+          <a:bodyPr wrap="square" rtlCol="0">
+            <a:spAutoFit/>
+          </a:bodyPr>
+          <a:lstStyle/>
+          <a:p>
+            <a:r>
+              <a:rPr lang="en-US" smtClean="0"/>
+              <a:t>X</a:t>
+            </a:r>
+            <a:endParaRPr lang="en-US"/>
+          </a:p>
+        </p:txBody>
+      </p:sp>
+      <p:sp>
+        <p:nvSpPr>
+          <p:cNvPr id="62" name="TextBox 61"/>
+          <p:cNvSpPr txBox="1"/>
+          <p:nvPr/>
+        </p:nvSpPr>
+        <p:spPr>
+          <a:xfrm>
+            <a:off x="6627943" y="5675494"/>
+            <a:ext cx="376751" cy="369332"/>
+          </a:xfrm>
+          <a:prstGeom prst="rect">
+            <a:avLst/>
+          </a:prstGeom>
+          <a:noFill/>
+        </p:spPr>
+        <p:txBody>
+          <a:bodyPr wrap="square" rtlCol="0">
+            <a:spAutoFit/>
+          </a:bodyPr>
+          <a:lstStyle/>
+          <a:p>
+            <a:r>
+              <a:rPr lang="en-US" smtClean="0"/>
+              <a:t>X</a:t>
+            </a:r>
+            <a:endParaRPr lang="en-US"/>
+          </a:p>
+        </p:txBody>
+      </p:sp>
+      <p:cxnSp>
+        <p:nvCxnSpPr>
+          <p:cNvPr id="63" name="Straight Connector 62"/>
+          <p:cNvCxnSpPr>
+            <a:stCxn id="88" idx="0"/>
+          </p:cNvCxnSpPr>
+          <p:nvPr/>
+        </p:nvCxnSpPr>
+        <p:spPr>
+          <a:xfrm flipH="1">
+            <a:off x="2808189" y="5566427"/>
+            <a:ext cx="1593" cy="279498"/>
+          </a:xfrm>
+          <a:prstGeom prst="line">
+            <a:avLst/>
+          </a:prstGeom>
+          <a:ln w="19050">
+            <a:solidFill>
+              <a:srgbClr val="0070C0"/>
+            </a:solidFill>
+            <a:prstDash val="sysDash"/>
+          </a:ln>
+          <a:effectLst/>
+        </p:spPr>
+        <p:style>
+          <a:lnRef idx="1">
+            <a:schemeClr val="accent1"/>
+          </a:lnRef>
+          <a:fillRef idx="2">
+            <a:schemeClr val="accent1"/>
+          </a:fillRef>
+          <a:effectRef idx="1">
+            <a:schemeClr val="accent1"/>
+          </a:effectRef>
+          <a:fontRef idx="minor">
+            <a:schemeClr val="dk1"/>
+          </a:fontRef>
+        </p:style>
+      </p:cxnSp>
+      <p:sp>
+        <p:nvSpPr>
+          <p:cNvPr id="68" name="TextBox 67"/>
+          <p:cNvSpPr txBox="1"/>
+          <p:nvPr/>
+        </p:nvSpPr>
+        <p:spPr>
+          <a:xfrm>
+            <a:off x="2655118" y="5706176"/>
+            <a:ext cx="376751" cy="369332"/>
+          </a:xfrm>
+          <a:prstGeom prst="rect">
+            <a:avLst/>
+          </a:prstGeom>
+          <a:noFill/>
+        </p:spPr>
+        <p:txBody>
+          <a:bodyPr wrap="square" rtlCol="0">
+            <a:spAutoFit/>
+          </a:bodyPr>
+          <a:lstStyle/>
+          <a:p>
+            <a:r>
+              <a:rPr lang="en-US" smtClean="0"/>
+              <a:t>X</a:t>
+            </a:r>
+            <a:endParaRPr lang="en-US"/>
+          </a:p>
+        </p:txBody>
+      </p:sp>
     </p:spTree>
     <p:extLst>
       <p:ext uri="{BB962C8B-B14F-4D97-AF65-F5344CB8AC3E}">

</xml_diff>